<commit_message>
Added DB part to the poster
</commit_message>
<xml_diff>
--- a/DimesVis/Documentation/פוסטר.pptx
+++ b/DimesVis/Documentation/פוסטר.pptx
@@ -218,6 +218,7 @@
           <a:p>
             <a:fld id="{6856F4A9-20AC-40C1-8481-08D3AFBF8A29}" type="datetimeFigureOut">
               <a:rPr lang="he-IL" smtClean="0"/>
+              <a:pPr/>
               <a:t>כ'/אב/תשע"ב</a:t>
             </a:fld>
             <a:endParaRPr lang="he-IL"/>
@@ -260,6 +261,7 @@
           <a:p>
             <a:fld id="{499CAECC-454B-49AD-B174-BCA02A77C16D}" type="slidenum">
               <a:rPr lang="he-IL" smtClean="0"/>
+              <a:pPr/>
               <a:t>‹#›</a:t>
             </a:fld>
             <a:endParaRPr lang="he-IL"/>
@@ -444,6 +446,7 @@
           <a:p>
             <a:fld id="{6856F4A9-20AC-40C1-8481-08D3AFBF8A29}" type="datetimeFigureOut">
               <a:rPr lang="he-IL" smtClean="0"/>
+              <a:pPr/>
               <a:t>כ'/אב/תשע"ב</a:t>
             </a:fld>
             <a:endParaRPr lang="he-IL"/>
@@ -486,6 +489,7 @@
           <a:p>
             <a:fld id="{499CAECC-454B-49AD-B174-BCA02A77C16D}" type="slidenum">
               <a:rPr lang="he-IL" smtClean="0"/>
+              <a:pPr/>
               <a:t>‹#›</a:t>
             </a:fld>
             <a:endParaRPr lang="he-IL"/>
@@ -619,6 +623,7 @@
           <a:p>
             <a:fld id="{6856F4A9-20AC-40C1-8481-08D3AFBF8A29}" type="datetimeFigureOut">
               <a:rPr lang="he-IL" smtClean="0"/>
+              <a:pPr/>
               <a:t>כ'/אב/תשע"ב</a:t>
             </a:fld>
             <a:endParaRPr lang="he-IL"/>
@@ -661,6 +666,7 @@
           <a:p>
             <a:fld id="{499CAECC-454B-49AD-B174-BCA02A77C16D}" type="slidenum">
               <a:rPr lang="he-IL" smtClean="0"/>
+              <a:pPr/>
               <a:t>‹#›</a:t>
             </a:fld>
             <a:endParaRPr lang="he-IL"/>
@@ -784,6 +790,7 @@
           <a:p>
             <a:fld id="{6856F4A9-20AC-40C1-8481-08D3AFBF8A29}" type="datetimeFigureOut">
               <a:rPr lang="he-IL" smtClean="0"/>
+              <a:pPr/>
               <a:t>כ'/אב/תשע"ב</a:t>
             </a:fld>
             <a:endParaRPr lang="he-IL"/>
@@ -826,6 +833,7 @@
           <a:p>
             <a:fld id="{499CAECC-454B-49AD-B174-BCA02A77C16D}" type="slidenum">
               <a:rPr lang="he-IL" smtClean="0"/>
+              <a:pPr/>
               <a:t>‹#›</a:t>
             </a:fld>
             <a:endParaRPr lang="he-IL"/>
@@ -1028,6 +1036,7 @@
           <a:p>
             <a:fld id="{6856F4A9-20AC-40C1-8481-08D3AFBF8A29}" type="datetimeFigureOut">
               <a:rPr lang="he-IL" smtClean="0"/>
+              <a:pPr/>
               <a:t>כ'/אב/תשע"ב</a:t>
             </a:fld>
             <a:endParaRPr lang="he-IL"/>
@@ -1075,6 +1084,7 @@
           <a:p>
             <a:fld id="{499CAECC-454B-49AD-B174-BCA02A77C16D}" type="slidenum">
               <a:rPr lang="he-IL" smtClean="0"/>
+              <a:pPr/>
               <a:t>‹#›</a:t>
             </a:fld>
             <a:endParaRPr lang="he-IL"/>
@@ -1292,6 +1302,7 @@
           <a:p>
             <a:fld id="{6856F4A9-20AC-40C1-8481-08D3AFBF8A29}" type="datetimeFigureOut">
               <a:rPr lang="he-IL" smtClean="0"/>
+              <a:pPr/>
               <a:t>כ'/אב/תשע"ב</a:t>
             </a:fld>
             <a:endParaRPr lang="he-IL"/>
@@ -1334,6 +1345,7 @@
           <a:p>
             <a:fld id="{499CAECC-454B-49AD-B174-BCA02A77C16D}" type="slidenum">
               <a:rPr lang="he-IL" smtClean="0"/>
+              <a:pPr/>
               <a:t>‹#›</a:t>
             </a:fld>
             <a:endParaRPr lang="he-IL"/>
@@ -1666,6 +1678,7 @@
           <a:p>
             <a:fld id="{6856F4A9-20AC-40C1-8481-08D3AFBF8A29}" type="datetimeFigureOut">
               <a:rPr lang="he-IL" smtClean="0"/>
+              <a:pPr/>
               <a:t>כ'/אב/תשע"ב</a:t>
             </a:fld>
             <a:endParaRPr lang="he-IL"/>
@@ -1708,6 +1721,7 @@
           <a:p>
             <a:fld id="{499CAECC-454B-49AD-B174-BCA02A77C16D}" type="slidenum">
               <a:rPr lang="he-IL" smtClean="0"/>
+              <a:pPr/>
               <a:t>‹#›</a:t>
             </a:fld>
             <a:endParaRPr lang="he-IL"/>
@@ -1779,6 +1793,7 @@
           <a:p>
             <a:fld id="{6856F4A9-20AC-40C1-8481-08D3AFBF8A29}" type="datetimeFigureOut">
               <a:rPr lang="he-IL" smtClean="0"/>
+              <a:pPr/>
               <a:t>כ'/אב/תשע"ב</a:t>
             </a:fld>
             <a:endParaRPr lang="he-IL"/>
@@ -1821,6 +1836,7 @@
           <a:p>
             <a:fld id="{499CAECC-454B-49AD-B174-BCA02A77C16D}" type="slidenum">
               <a:rPr lang="he-IL" smtClean="0"/>
+              <a:pPr/>
               <a:t>‹#›</a:t>
             </a:fld>
             <a:endParaRPr lang="he-IL"/>
@@ -1869,6 +1885,7 @@
           <a:p>
             <a:fld id="{6856F4A9-20AC-40C1-8481-08D3AFBF8A29}" type="datetimeFigureOut">
               <a:rPr lang="he-IL" smtClean="0"/>
+              <a:pPr/>
               <a:t>כ'/אב/תשע"ב</a:t>
             </a:fld>
             <a:endParaRPr lang="he-IL"/>
@@ -1911,6 +1928,7 @@
           <a:p>
             <a:fld id="{499CAECC-454B-49AD-B174-BCA02A77C16D}" type="slidenum">
               <a:rPr lang="he-IL" smtClean="0"/>
+              <a:pPr/>
               <a:t>‹#›</a:t>
             </a:fld>
             <a:endParaRPr lang="he-IL"/>
@@ -2127,6 +2145,7 @@
           <a:p>
             <a:fld id="{6856F4A9-20AC-40C1-8481-08D3AFBF8A29}" type="datetimeFigureOut">
               <a:rPr lang="he-IL" smtClean="0"/>
+              <a:pPr/>
               <a:t>כ'/אב/תשע"ב</a:t>
             </a:fld>
             <a:endParaRPr lang="he-IL"/>
@@ -2169,6 +2188,7 @@
           <a:p>
             <a:fld id="{499CAECC-454B-49AD-B174-BCA02A77C16D}" type="slidenum">
               <a:rPr lang="he-IL" smtClean="0"/>
+              <a:pPr/>
               <a:t>‹#›</a:t>
             </a:fld>
             <a:endParaRPr lang="he-IL"/>
@@ -2391,6 +2411,7 @@
           <a:p>
             <a:fld id="{6856F4A9-20AC-40C1-8481-08D3AFBF8A29}" type="datetimeFigureOut">
               <a:rPr lang="he-IL" smtClean="0"/>
+              <a:pPr/>
               <a:t>כ'/אב/תשע"ב</a:t>
             </a:fld>
             <a:endParaRPr lang="he-IL"/>
@@ -2433,6 +2454,7 @@
           <a:p>
             <a:fld id="{499CAECC-454B-49AD-B174-BCA02A77C16D}" type="slidenum">
               <a:rPr lang="he-IL" smtClean="0"/>
+              <a:pPr/>
               <a:t>‹#›</a:t>
             </a:fld>
             <a:endParaRPr lang="he-IL"/>
@@ -2608,6 +2630,7 @@
           <a:p>
             <a:fld id="{6856F4A9-20AC-40C1-8481-08D3AFBF8A29}" type="datetimeFigureOut">
               <a:rPr lang="he-IL" smtClean="0"/>
+              <a:pPr/>
               <a:t>כ'/אב/תשע"ב</a:t>
             </a:fld>
             <a:endParaRPr lang="he-IL"/>
@@ -2686,6 +2709,7 @@
           <a:p>
             <a:fld id="{499CAECC-454B-49AD-B174-BCA02A77C16D}" type="slidenum">
               <a:rPr lang="he-IL" smtClean="0"/>
+              <a:pPr/>
               <a:t>‹#›</a:t>
             </a:fld>
             <a:endParaRPr lang="he-IL"/>
@@ -3078,8 +3102,8 @@
         </p:nvSpPr>
         <p:spPr>
           <a:xfrm>
-            <a:off x="3036114" y="152400"/>
-            <a:ext cx="2977162" cy="830997"/>
+            <a:off x="2754018" y="152400"/>
+            <a:ext cx="3541355" cy="830997"/>
           </a:xfrm>
           <a:prstGeom prst="rect">
             <a:avLst/>
@@ -3148,7 +3172,7 @@
                   </a:glow>
                 </a:effectLst>
               </a:rPr>
-              <a:t>of network distances</a:t>
+              <a:t>of  Network Distances</a:t>
             </a:r>
             <a:endParaRPr lang="en-US" sz="2400" b="1" spc="50" dirty="0">
               <a:ln w="12700" cmpd="sng">
@@ -3188,7 +3212,7 @@
         <p:spPr bwMode="auto">
           <a:xfrm>
             <a:off x="228600" y="838200"/>
-            <a:ext cx="2209800" cy="5309146"/>
+            <a:ext cx="2209800" cy="4878259"/>
           </a:xfrm>
           <a:prstGeom prst="rect">
             <a:avLst/>
@@ -3285,7 +3309,27 @@
                   </a:outerShdw>
                 </a:effectLst>
               </a:rPr>
-              <a:t>a tool that would give a visual enhancement to  stored data from researches done in Dimes, the main approach was to show a visual graph for the ratio between network distances and real distances. </a:t>
+              <a:t>a tool that would give a visual enhancement to  stored data from researches done </a:t>
+            </a:r>
+            <a:r>
+              <a:rPr lang="en-US" sz="900" b="1" dirty="0" smtClean="0">
+                <a:effectLst>
+                  <a:outerShdw blurRad="38100" dist="38100" dir="2700000" algn="tl">
+                    <a:srgbClr val="808080"/>
+                  </a:outerShdw>
+                </a:effectLst>
+              </a:rPr>
+              <a:t>with DIMES, </a:t>
+            </a:r>
+            <a:r>
+              <a:rPr lang="en-US" sz="900" b="1" dirty="0" smtClean="0">
+                <a:effectLst>
+                  <a:outerShdw blurRad="38100" dist="38100" dir="2700000" algn="tl">
+                    <a:srgbClr val="808080"/>
+                  </a:outerShdw>
+                </a:effectLst>
+              </a:rPr>
+              <a:t>the main approach was to show a visual graph for the ratio between network distances and real distances. </a:t>
             </a:r>
             <a:endParaRPr lang="en-US" sz="900" b="1" dirty="0">
               <a:effectLst>
@@ -3301,40 +3345,94 @@
               <a:buChar char="•"/>
             </a:pPr>
             <a:r>
-              <a:rPr lang="en-US" sz="900" b="1" dirty="0">
-                <a:effectLst>
-                  <a:outerShdw blurRad="38100" dist="38100" dir="2700000" algn="tl">
-                    <a:srgbClr val="808080"/>
-                  </a:outerShdw>
-                </a:effectLst>
-              </a:rPr>
-              <a:t>  Snake robots have many applications, but are hard to control since they have many internal degrees of freedom.</a:t>
-            </a:r>
-          </a:p>
-          <a:p>
-            <a:pPr algn="l" rtl="0">
-              <a:buFontTx/>
-              <a:buChar char="•"/>
-            </a:pPr>
-            <a:r>
-              <a:rPr lang="en-US" sz="900" b="1" dirty="0">
-                <a:effectLst>
-                  <a:outerShdw blurRad="38100" dist="38100" dir="2700000" algn="tl">
-                    <a:srgbClr val="808080"/>
-                  </a:outerShdw>
-                </a:effectLst>
-              </a:rPr>
-              <a:t>  </a:t>
-            </a:r>
-            <a:r>
-              <a:rPr lang="en-US" sz="900" b="1" dirty="0" smtClean="0">
-                <a:effectLst>
-                  <a:outerShdw blurRad="38100" dist="38100" dir="2700000" algn="tl">
-                    <a:srgbClr val="808080"/>
-                  </a:outerShdw>
-                </a:effectLst>
-              </a:rPr>
-              <a:t>better understanding of network area distances  may help in spotting  a ‘bad’ area that needs to be fixed, or a better area, that is preferred to be used. </a:t>
+              <a:rPr lang="en-US" sz="900" b="1" dirty="0" smtClean="0">
+                <a:effectLst>
+                  <a:outerShdw blurRad="38100" dist="38100" dir="2700000" algn="tl">
+                    <a:srgbClr val="808080"/>
+                  </a:outerShdw>
+                </a:effectLst>
+              </a:rPr>
+              <a:t>  Better </a:t>
+            </a:r>
+            <a:r>
+              <a:rPr lang="en-US" sz="900" b="1" dirty="0" smtClean="0">
+                <a:effectLst>
+                  <a:outerShdw blurRad="38100" dist="38100" dir="2700000" algn="tl">
+                    <a:srgbClr val="808080"/>
+                  </a:outerShdw>
+                </a:effectLst>
+              </a:rPr>
+              <a:t>understanding of network area distances  may help in spotting  a </a:t>
+            </a:r>
+            <a:r>
+              <a:rPr lang="en-US" sz="900" b="1" dirty="0" smtClean="0">
+                <a:effectLst>
+                  <a:outerShdw blurRad="38100" dist="38100" dir="2700000" algn="tl">
+                    <a:srgbClr val="808080"/>
+                  </a:outerShdw>
+                </a:effectLst>
+              </a:rPr>
+              <a:t>‘</a:t>
+            </a:r>
+            <a:r>
+              <a:rPr lang="en-US" sz="900" b="1" dirty="0" smtClean="0">
+                <a:effectLst>
+                  <a:outerShdw blurRad="38100" dist="38100" dir="2700000" algn="tl">
+                    <a:srgbClr val="808080"/>
+                  </a:outerShdw>
+                </a:effectLst>
+              </a:rPr>
+              <a:t>slow</a:t>
+            </a:r>
+            <a:r>
+              <a:rPr lang="en-US" sz="900" b="1" dirty="0" smtClean="0">
+                <a:effectLst>
+                  <a:outerShdw blurRad="38100" dist="38100" dir="2700000" algn="tl">
+                    <a:srgbClr val="808080"/>
+                  </a:outerShdw>
+                </a:effectLst>
+              </a:rPr>
+              <a:t>’ </a:t>
+            </a:r>
+            <a:r>
+              <a:rPr lang="en-US" sz="900" b="1" dirty="0" smtClean="0">
+                <a:effectLst>
+                  <a:outerShdw blurRad="38100" dist="38100" dir="2700000" algn="tl">
+                    <a:srgbClr val="808080"/>
+                  </a:outerShdw>
+                </a:effectLst>
+              </a:rPr>
+              <a:t>area that needs to be </a:t>
+            </a:r>
+            <a:r>
+              <a:rPr lang="en-US" sz="900" b="1" dirty="0" smtClean="0">
+                <a:effectLst>
+                  <a:outerShdw blurRad="38100" dist="38100" dir="2700000" algn="tl">
+                    <a:srgbClr val="808080"/>
+                  </a:outerShdw>
+                </a:effectLst>
+              </a:rPr>
+              <a:t>fixed or decongested, and spotting </a:t>
+            </a:r>
+            <a:r>
+              <a:rPr lang="en-US" sz="900" b="1" dirty="0" smtClean="0">
+                <a:effectLst>
+                  <a:outerShdw blurRad="38100" dist="38100" dir="2700000" algn="tl">
+                    <a:srgbClr val="808080"/>
+                  </a:outerShdw>
+                </a:effectLst>
+              </a:rPr>
+              <a:t>a better area, that is preferred to be </a:t>
+            </a:r>
+            <a:r>
+              <a:rPr lang="en-US" sz="900" b="1" dirty="0" smtClean="0">
+                <a:effectLst>
+                  <a:outerShdw blurRad="38100" dist="38100" dir="2700000" algn="tl">
+                    <a:srgbClr val="808080"/>
+                  </a:outerShdw>
+                </a:effectLst>
+              </a:rPr>
+              <a:t>used for routing through it. </a:t>
             </a:r>
             <a:endParaRPr lang="ar-SA" sz="900" b="1" dirty="0">
               <a:effectLst>
@@ -3410,33 +3508,37 @@
                   </a:outerShdw>
                 </a:effectLst>
               </a:rPr>
-              <a:t> At the beginning of the application, the user is needed to choose how to connect and where to connect to the Dimes DB,</a:t>
-            </a:r>
-          </a:p>
-          <a:p>
-            <a:pPr algn="l" rtl="0"/>
-            <a:r>
-              <a:rPr lang="en-US" sz="900" b="1" dirty="0" smtClean="0">
-                <a:effectLst>
-                  <a:outerShdw blurRad="38100" dist="38100" dir="2700000" algn="tl">
-                    <a:srgbClr val="808080"/>
-                  </a:outerShdw>
-                </a:effectLst>
-              </a:rPr>
-              <a:t>And also give extra information regarding how to manipulate the information coming back from the DB, and how it will be presented.</a:t>
-            </a:r>
-          </a:p>
-          <a:p>
-            <a:pPr algn="l" rtl="0"/>
-            <a:r>
-              <a:rPr lang="en-US" sz="900" b="1" dirty="0" smtClean="0">
-                <a:effectLst>
-                  <a:outerShdw blurRad="38100" dist="38100" dir="2700000" algn="tl">
-                    <a:srgbClr val="808080"/>
-                  </a:outerShdw>
-                </a:effectLst>
-              </a:rPr>
-              <a:t>After all these configurations where set, a  confirmation alert will pop and user can review his choices.</a:t>
+              <a:t> At the beginning of the application, the user is </a:t>
+            </a:r>
+            <a:r>
+              <a:rPr lang="en-US" sz="900" b="1" dirty="0" smtClean="0">
+                <a:effectLst>
+                  <a:outerShdw blurRad="38100" dist="38100" dir="2700000" algn="tl">
+                    <a:srgbClr val="808080"/>
+                  </a:outerShdw>
+                </a:effectLst>
+              </a:rPr>
+              <a:t>asked to </a:t>
+            </a:r>
+            <a:r>
+              <a:rPr lang="en-US" sz="900" b="1" dirty="0" smtClean="0">
+                <a:effectLst>
+                  <a:outerShdw blurRad="38100" dist="38100" dir="2700000" algn="tl">
+                    <a:srgbClr val="808080"/>
+                  </a:outerShdw>
+                </a:effectLst>
+              </a:rPr>
+              <a:t>choose how to connect and where to connect to the </a:t>
+            </a:r>
+            <a:r>
+              <a:rPr lang="en-US" sz="900" b="1" dirty="0" smtClean="0">
+                <a:effectLst>
+                  <a:outerShdw blurRad="38100" dist="38100" dir="2700000" algn="tl">
+                    <a:srgbClr val="808080"/>
+                  </a:outerShdw>
+                </a:effectLst>
+              </a:rPr>
+              <a:t>DIMES DB</a:t>
             </a:r>
           </a:p>
           <a:p>
@@ -3452,7 +3554,116 @@
                   </a:outerShdw>
                 </a:effectLst>
               </a:rPr>
-              <a:t> The GUI was done using SWT (a JAVA library)</a:t>
+              <a:t> The user is </a:t>
+            </a:r>
+            <a:r>
+              <a:rPr lang="en-US" sz="900" b="1" dirty="0" smtClean="0">
+                <a:effectLst>
+                  <a:outerShdw blurRad="38100" dist="38100" dir="2700000" algn="tl">
+                    <a:srgbClr val="808080"/>
+                  </a:outerShdw>
+                </a:effectLst>
+              </a:rPr>
+              <a:t>also given </a:t>
+            </a:r>
+            <a:r>
+              <a:rPr lang="en-US" sz="900" b="1" dirty="0" smtClean="0">
+                <a:effectLst>
+                  <a:outerShdw blurRad="38100" dist="38100" dir="2700000" algn="tl">
+                    <a:srgbClr val="808080"/>
+                  </a:outerShdw>
+                </a:effectLst>
+              </a:rPr>
+              <a:t>extra information regarding how to manipulate the information coming back from the DB, and how it will be presented.</a:t>
+            </a:r>
+          </a:p>
+          <a:p>
+            <a:pPr algn="l" rtl="0"/>
+            <a:r>
+              <a:rPr lang="en-US" sz="900" b="1" dirty="0" smtClean="0">
+                <a:effectLst>
+                  <a:outerShdw blurRad="38100" dist="38100" dir="2700000" algn="tl">
+                    <a:srgbClr val="808080"/>
+                  </a:outerShdw>
+                </a:effectLst>
+              </a:rPr>
+              <a:t>After all these configurations </a:t>
+            </a:r>
+            <a:r>
+              <a:rPr lang="en-US" sz="900" b="1" dirty="0" smtClean="0">
+                <a:effectLst>
+                  <a:outerShdw blurRad="38100" dist="38100" dir="2700000" algn="tl">
+                    <a:srgbClr val="808080"/>
+                  </a:outerShdw>
+                </a:effectLst>
+              </a:rPr>
+              <a:t>were </a:t>
+            </a:r>
+            <a:r>
+              <a:rPr lang="en-US" sz="900" b="1" dirty="0" smtClean="0">
+                <a:effectLst>
+                  <a:outerShdw blurRad="38100" dist="38100" dir="2700000" algn="tl">
+                    <a:srgbClr val="808080"/>
+                  </a:outerShdw>
+                </a:effectLst>
+              </a:rPr>
+              <a:t>set, a  confirmation </a:t>
+            </a:r>
+            <a:r>
+              <a:rPr lang="en-US" sz="900" b="1" dirty="0" smtClean="0">
+                <a:effectLst>
+                  <a:outerShdw blurRad="38100" dist="38100" dir="2700000" algn="tl">
+                    <a:srgbClr val="808080"/>
+                  </a:outerShdw>
+                </a:effectLst>
+              </a:rPr>
+              <a:t>screen will </a:t>
+            </a:r>
+            <a:r>
+              <a:rPr lang="en-US" sz="900" b="1" dirty="0" smtClean="0">
+                <a:effectLst>
+                  <a:outerShdw blurRad="38100" dist="38100" dir="2700000" algn="tl">
+                    <a:srgbClr val="808080"/>
+                  </a:outerShdw>
+                </a:effectLst>
+              </a:rPr>
+              <a:t>pop and user can review his choices.</a:t>
+            </a:r>
+          </a:p>
+          <a:p>
+            <a:pPr algn="l" rtl="0">
+              <a:buFont typeface="Arial" pitchFamily="34" charset="0"/>
+              <a:buChar char="•"/>
+            </a:pPr>
+            <a:r>
+              <a:rPr lang="en-US" sz="900" b="1" dirty="0" smtClean="0">
+                <a:effectLst>
+                  <a:outerShdw blurRad="38100" dist="38100" dir="2700000" algn="tl">
+                    <a:srgbClr val="808080"/>
+                  </a:outerShdw>
+                </a:effectLst>
+              </a:rPr>
+              <a:t> The GUI was done using SWT (a </a:t>
+            </a:r>
+            <a:r>
+              <a:rPr lang="en-US" sz="900" b="1" dirty="0" smtClean="0">
+                <a:effectLst>
+                  <a:outerShdw blurRad="38100" dist="38100" dir="2700000" algn="tl">
+                    <a:srgbClr val="808080"/>
+                  </a:outerShdw>
+                </a:effectLst>
+              </a:rPr>
+              <a:t>Java </a:t>
+            </a:r>
+            <a:r>
+              <a:rPr lang="en-US" sz="900" b="1" dirty="0" smtClean="0">
+                <a:effectLst>
+                  <a:outerShdw blurRad="38100" dist="38100" dir="2700000" algn="tl">
+                    <a:srgbClr val="808080"/>
+                  </a:outerShdw>
+                </a:effectLst>
+              </a:rPr>
+              <a:t>library)</a:t>
             </a:r>
             <a:endParaRPr lang="en-US" sz="900" b="1" dirty="0">
               <a:effectLst>
@@ -3474,8 +3685,8 @@
         </p:nvSpPr>
         <p:spPr bwMode="auto">
           <a:xfrm>
-            <a:off x="2819400" y="4495800"/>
-            <a:ext cx="3581400" cy="553998"/>
+            <a:off x="2590800" y="4267200"/>
+            <a:ext cx="3886200" cy="2492990"/>
           </a:xfrm>
           <a:prstGeom prst="rect">
             <a:avLst/>
@@ -3509,9 +3720,19 @@
                   </a:outerShdw>
                 </a:effectLst>
               </a:rPr>
-              <a:t>DB and Queries</a:t>
-            </a:r>
-            <a:endParaRPr lang="en-US" sz="1200" b="1" i="1" u="sng" dirty="0">
+              <a:t>DB and </a:t>
+            </a:r>
+            <a:r>
+              <a:rPr lang="en-US" sz="1200" b="1" i="1" u="sng" dirty="0" smtClean="0">
+                <a:effectLst>
+                  <a:outerShdw blurRad="38100" dist="38100" dir="2700000" algn="tl">
+                    <a:srgbClr val="808080"/>
+                  </a:outerShdw>
+                </a:effectLst>
+              </a:rPr>
+              <a:t>Queries</a:t>
+            </a:r>
+            <a:endParaRPr lang="en-US" sz="900" b="1" dirty="0" smtClean="0">
               <a:effectLst>
                 <a:outerShdw blurRad="38100" dist="38100" dir="2700000" algn="tl">
                   <a:srgbClr val="808080"/>
@@ -3532,7 +3753,37 @@
                   </a:outerShdw>
                 </a:effectLst>
               </a:rPr>
-              <a:t> …</a:t>
+              <a:t> </a:t>
+            </a:r>
+            <a:r>
+              <a:rPr lang="en-US" sz="900" b="1" dirty="0" smtClean="0">
+                <a:effectLst>
+                  <a:outerShdw blurRad="38100" dist="38100" dir="2700000" algn="tl">
+                    <a:srgbClr val="808080"/>
+                  </a:outerShdw>
+                </a:effectLst>
+              </a:rPr>
+              <a:t>The code querying the DIMES DB </a:t>
+            </a:r>
+            <a:r>
+              <a:rPr lang="en-US" sz="900" b="1" dirty="0" smtClean="0">
+                <a:effectLst>
+                  <a:outerShdw blurRad="38100" dist="38100" dir="2700000" algn="tl">
+                    <a:srgbClr val="808080"/>
+                  </a:outerShdw>
+                </a:effectLst>
+              </a:rPr>
+              <a:t>was implemented </a:t>
+            </a:r>
+            <a:r>
+              <a:rPr lang="en-US" sz="900" b="1" dirty="0" smtClean="0">
+                <a:effectLst>
+                  <a:outerShdw blurRad="38100" dist="38100" dir="2700000" algn="tl">
+                    <a:srgbClr val="808080"/>
+                  </a:outerShdw>
+                </a:effectLst>
+              </a:rPr>
+              <a:t>in Java using  MySQL API given as a .jar file distributed in the internet</a:t>
             </a:r>
           </a:p>
           <a:p>
@@ -3548,27 +3799,209 @@
                   </a:outerShdw>
                 </a:effectLst>
               </a:rPr>
-              <a:t>  the DB code was implemented using  my-</a:t>
-            </a:r>
-            <a:r>
-              <a:rPr lang="en-US" sz="900" b="1" dirty="0" err="1" smtClean="0">
-                <a:effectLst>
-                  <a:outerShdw blurRad="38100" dist="38100" dir="2700000" algn="tl">
-                    <a:srgbClr val="808080"/>
-                  </a:outerShdw>
-                </a:effectLst>
-              </a:rPr>
-              <a:t>sql</a:t>
-            </a:r>
-            <a:r>
-              <a:rPr lang="en-US" sz="900" b="1" dirty="0" smtClean="0">
-                <a:effectLst>
-                  <a:outerShdw blurRad="38100" dist="38100" dir="2700000" algn="tl">
-                    <a:srgbClr val="808080"/>
-                  </a:outerShdw>
-                </a:effectLst>
-              </a:rPr>
-              <a:t>-java  jar library</a:t>
+              <a:t> </a:t>
+            </a:r>
+            <a:r>
+              <a:rPr lang="en-US" sz="900" b="1" dirty="0" smtClean="0">
+                <a:effectLst>
+                  <a:outerShdw blurRad="38100" dist="38100" dir="2700000" algn="tl">
+                    <a:srgbClr val="808080"/>
+                  </a:outerShdw>
+                </a:effectLst>
+              </a:rPr>
+              <a:t>We work with two connection objects since the schemas containing the tables with data on the experiments reside on a different server then the schema containing the mapping between IP and it’s geo-location (longitude-latitude)</a:t>
+            </a:r>
+          </a:p>
+          <a:p>
+            <a:pPr algn="l" rtl="0">
+              <a:buFontTx/>
+              <a:buChar char="•"/>
+            </a:pPr>
+            <a:r>
+              <a:rPr lang="en-US" sz="900" b="1" dirty="0" smtClean="0">
+                <a:effectLst>
+                  <a:outerShdw blurRad="38100" dist="38100" dir="2700000" algn="tl">
+                    <a:srgbClr val="808080"/>
+                  </a:outerShdw>
+                </a:effectLst>
+              </a:rPr>
+              <a:t> </a:t>
+            </a:r>
+            <a:r>
+              <a:rPr lang="en-US" sz="900" b="1" dirty="0" smtClean="0">
+                <a:effectLst>
+                  <a:outerShdw blurRad="38100" dist="38100" dir="2700000" algn="tl">
+                    <a:srgbClr val="808080"/>
+                  </a:outerShdw>
+                </a:effectLst>
+              </a:rPr>
+              <a:t>Using parameters in our code we were able to allow the user to have many choices over the queries we run</a:t>
+            </a:r>
+          </a:p>
+          <a:p>
+            <a:pPr lvl="1" algn="l" rtl="0">
+              <a:buFontTx/>
+              <a:buChar char="•"/>
+            </a:pPr>
+            <a:r>
+              <a:rPr lang="en-US" sz="900" b="1" dirty="0" smtClean="0">
+                <a:effectLst>
+                  <a:outerShdw blurRad="38100" dist="38100" dir="2700000" algn="tl">
+                    <a:srgbClr val="808080"/>
+                  </a:outerShdw>
+                </a:effectLst>
+              </a:rPr>
+              <a:t> </a:t>
+            </a:r>
+            <a:r>
+              <a:rPr lang="en-US" sz="900" b="1" dirty="0" smtClean="0">
+                <a:effectLst>
+                  <a:outerShdw blurRad="38100" dist="38100" dir="2700000" algn="tl">
+                    <a:srgbClr val="808080"/>
+                  </a:outerShdw>
+                </a:effectLst>
+              </a:rPr>
+              <a:t>Specific date</a:t>
+            </a:r>
+          </a:p>
+          <a:p>
+            <a:pPr lvl="1" algn="l" rtl="0">
+              <a:buFontTx/>
+              <a:buChar char="•"/>
+            </a:pPr>
+            <a:r>
+              <a:rPr lang="en-US" sz="900" b="1" dirty="0" smtClean="0">
+                <a:effectLst>
+                  <a:outerShdw blurRad="38100" dist="38100" dir="2700000" algn="tl">
+                    <a:srgbClr val="808080"/>
+                  </a:outerShdw>
+                </a:effectLst>
+              </a:rPr>
+              <a:t> </a:t>
+            </a:r>
+            <a:r>
+              <a:rPr lang="en-US" sz="900" b="1" dirty="0" smtClean="0">
+                <a:effectLst>
+                  <a:outerShdw blurRad="38100" dist="38100" dir="2700000" algn="tl">
+                    <a:srgbClr val="808080"/>
+                  </a:outerShdw>
+                </a:effectLst>
+              </a:rPr>
+              <a:t>Limit the number of results (or no limit)</a:t>
+            </a:r>
+          </a:p>
+          <a:p>
+            <a:pPr lvl="1" algn="l" rtl="0">
+              <a:buFontTx/>
+              <a:buChar char="•"/>
+            </a:pPr>
+            <a:r>
+              <a:rPr lang="en-US" sz="900" b="1" dirty="0" smtClean="0">
+                <a:effectLst>
+                  <a:outerShdw blurRad="38100" dist="38100" dir="2700000" algn="tl">
+                    <a:srgbClr val="808080"/>
+                  </a:outerShdw>
+                </a:effectLst>
+              </a:rPr>
+              <a:t> </a:t>
+            </a:r>
+            <a:r>
+              <a:rPr lang="en-US" sz="900" b="1" dirty="0" smtClean="0">
+                <a:effectLst>
+                  <a:outerShdw blurRad="38100" dist="38100" dir="2700000" algn="tl">
+                    <a:srgbClr val="808080"/>
+                  </a:outerShdw>
+                </a:effectLst>
+              </a:rPr>
+              <a:t>Choose between using best, average or worst time</a:t>
+            </a:r>
+          </a:p>
+          <a:p>
+            <a:pPr lvl="1" algn="l" rtl="0">
+              <a:buFontTx/>
+              <a:buChar char="•"/>
+            </a:pPr>
+            <a:r>
+              <a:rPr lang="en-US" sz="900" b="1" dirty="0" smtClean="0">
+                <a:effectLst>
+                  <a:outerShdw blurRad="38100" dist="38100" dir="2700000" algn="tl">
+                    <a:srgbClr val="808080"/>
+                  </a:outerShdw>
+                </a:effectLst>
+              </a:rPr>
+              <a:t> </a:t>
+            </a:r>
+            <a:r>
+              <a:rPr lang="en-US" sz="900" b="1" dirty="0" smtClean="0">
+                <a:effectLst>
+                  <a:outerShdw blurRad="38100" dist="38100" dir="2700000" algn="tl">
+                    <a:srgbClr val="808080"/>
+                  </a:outerShdw>
+                </a:effectLst>
+              </a:rPr>
+              <a:t>Include specific IPs or use a list of only specific IPs</a:t>
+            </a:r>
+          </a:p>
+          <a:p>
+            <a:pPr lvl="1" algn="l" rtl="0">
+              <a:buFontTx/>
+              <a:buChar char="•"/>
+            </a:pPr>
+            <a:r>
+              <a:rPr lang="en-US" sz="900" b="1" dirty="0" smtClean="0">
+                <a:effectLst>
+                  <a:outerShdw blurRad="38100" dist="38100" dir="2700000" algn="tl">
+                    <a:srgbClr val="808080"/>
+                  </a:outerShdw>
+                </a:effectLst>
+              </a:rPr>
+              <a:t> </a:t>
+            </a:r>
+            <a:r>
+              <a:rPr lang="en-US" sz="900" b="1" dirty="0" smtClean="0">
+                <a:effectLst>
+                  <a:outerShdw blurRad="38100" dist="38100" dir="2700000" algn="tl">
+                    <a:srgbClr val="808080"/>
+                  </a:outerShdw>
+                </a:effectLst>
+              </a:rPr>
+              <a:t>Exclude specific IPs from the results</a:t>
+            </a:r>
+          </a:p>
+          <a:p>
+            <a:pPr algn="l" rtl="0">
+              <a:buFontTx/>
+              <a:buChar char="•"/>
+            </a:pPr>
+            <a:r>
+              <a:rPr lang="en-US" sz="900" b="1" dirty="0" smtClean="0">
+                <a:effectLst>
+                  <a:outerShdw blurRad="38100" dist="38100" dir="2700000" algn="tl">
+                    <a:srgbClr val="808080"/>
+                  </a:outerShdw>
+                </a:effectLst>
+              </a:rPr>
+              <a:t> </a:t>
+            </a:r>
+            <a:r>
+              <a:rPr lang="en-US" sz="900" b="1" dirty="0" smtClean="0">
+                <a:effectLst>
+                  <a:outerShdw blurRad="38100" dist="38100" dir="2700000" algn="tl">
+                    <a:srgbClr val="808080"/>
+                  </a:outerShdw>
+                </a:effectLst>
+              </a:rPr>
+              <a:t>Finally we write the data collected to a file, </a:t>
+            </a:r>
+            <a:r>
+              <a:rPr lang="en-US" sz="900" b="1" dirty="0" smtClean="0">
+                <a:effectLst>
+                  <a:outerShdw blurRad="38100" dist="38100" dir="2700000" algn="tl">
+                    <a:srgbClr val="808080"/>
+                  </a:outerShdw>
+                </a:effectLst>
+              </a:rPr>
+              <a:t>that would be read by the Matlab module. The file is written in a certain way that the Matlab module expects</a:t>
             </a:r>
             <a:endParaRPr lang="ar-SA" sz="900" b="1" dirty="0">
               <a:effectLst>
@@ -3661,37 +4094,47 @@
                   </a:outerShdw>
                 </a:effectLst>
               </a:rPr>
-              <a:t>  </a:t>
-            </a:r>
-            <a:r>
-              <a:rPr lang="en-US" sz="900" b="1" dirty="0" smtClean="0">
-                <a:effectLst>
-                  <a:outerShdw blurRad="38100" dist="38100" dir="2700000" algn="tl">
-                    <a:srgbClr val="808080"/>
-                  </a:outerShdw>
-                </a:effectLst>
-              </a:rPr>
-              <a:t>the project will start form a script to run the application (</a:t>
-            </a:r>
-            <a:r>
-              <a:rPr lang="en-US" sz="900" b="1" dirty="0" err="1" smtClean="0">
-                <a:effectLst>
-                  <a:outerShdw blurRad="38100" dist="38100" dir="2700000" algn="tl">
-                    <a:srgbClr val="808080"/>
-                  </a:outerShdw>
-                </a:effectLst>
-              </a:rPr>
-              <a:t>i.e</a:t>
-            </a:r>
-            <a:r>
-              <a:rPr lang="en-US" sz="900" b="1" dirty="0" smtClean="0">
-                <a:effectLst>
-                  <a:outerShdw blurRad="38100" dist="38100" dir="2700000" algn="tl">
-                    <a:srgbClr val="808080"/>
-                  </a:outerShdw>
-                </a:effectLst>
-              </a:rPr>
-              <a:t> run the java files)</a:t>
+              <a:t> </a:t>
+            </a:r>
+            <a:r>
+              <a:rPr lang="en-US" sz="900" b="1" dirty="0" smtClean="0">
+                <a:effectLst>
+                  <a:outerShdw blurRad="38100" dist="38100" dir="2700000" algn="tl">
+                    <a:srgbClr val="808080"/>
+                  </a:outerShdw>
+                </a:effectLst>
+              </a:rPr>
+              <a:t>The </a:t>
+            </a:r>
+            <a:r>
+              <a:rPr lang="en-US" sz="900" b="1" dirty="0" smtClean="0">
+                <a:effectLst>
+                  <a:outerShdw blurRad="38100" dist="38100" dir="2700000" algn="tl">
+                    <a:srgbClr val="808080"/>
+                  </a:outerShdw>
+                </a:effectLst>
+              </a:rPr>
+              <a:t>project will start form a script to run the application (</a:t>
+            </a:r>
+            <a:r>
+              <a:rPr lang="en-US" sz="900" b="1" dirty="0" smtClean="0">
+                <a:effectLst>
+                  <a:outerShdw blurRad="38100" dist="38100" dir="2700000" algn="tl">
+                    <a:srgbClr val="808080"/>
+                  </a:outerShdw>
+                </a:effectLst>
+              </a:rPr>
+              <a:t>i.e. </a:t>
+            </a:r>
+            <a:r>
+              <a:rPr lang="en-US" sz="900" b="1" dirty="0" smtClean="0">
+                <a:effectLst>
+                  <a:outerShdw blurRad="38100" dist="38100" dir="2700000" algn="tl">
+                    <a:srgbClr val="808080"/>
+                  </a:outerShdw>
+                </a:effectLst>
+              </a:rPr>
+              <a:t>run the java files)</a:t>
             </a:r>
           </a:p>
           <a:p>
@@ -3759,28 +4202,35 @@
                   </a:outerShdw>
                 </a:effectLst>
               </a:rPr>
-              <a:t>prepare input file for </a:t>
-            </a:r>
-            <a:r>
-              <a:rPr lang="en-US" sz="900" b="1" dirty="0" err="1" smtClean="0">
-                <a:effectLst>
-                  <a:outerShdw blurRad="38100" dist="38100" dir="2700000" algn="tl">
-                    <a:srgbClr val="808080"/>
-                  </a:outerShdw>
-                </a:effectLst>
-              </a:rPr>
-              <a:t>matlab</a:t>
-            </a:r>
-            <a:r>
-              <a:rPr lang="en-US" sz="900" b="1" dirty="0" smtClean="0">
-                <a:effectLst>
-                  <a:outerShdw blurRad="38100" dist="38100" dir="2700000" algn="tl">
-                    <a:srgbClr val="808080"/>
-                  </a:outerShdw>
-                </a:effectLst>
-              </a:rPr>
-              <a:t> …</a:t>
-            </a:r>
+              <a:t>Prepare </a:t>
+            </a:r>
+            <a:r>
+              <a:rPr lang="en-US" sz="900" b="1" dirty="0" smtClean="0">
+                <a:effectLst>
+                  <a:outerShdw blurRad="38100" dist="38100" dir="2700000" algn="tl">
+                    <a:srgbClr val="808080"/>
+                  </a:outerShdw>
+                </a:effectLst>
+              </a:rPr>
+              <a:t>input file for </a:t>
+            </a:r>
+            <a:r>
+              <a:rPr lang="en-US" sz="900" b="1" dirty="0" smtClean="0">
+                <a:effectLst>
+                  <a:outerShdw blurRad="38100" dist="38100" dir="2700000" algn="tl">
+                    <a:srgbClr val="808080"/>
+                  </a:outerShdw>
+                </a:effectLst>
+              </a:rPr>
+              <a:t>Matlab…</a:t>
+            </a:r>
+            <a:endParaRPr lang="en-US" sz="900" b="1" dirty="0" smtClean="0">
+              <a:effectLst>
+                <a:outerShdw blurRad="38100" dist="38100" dir="2700000" algn="tl">
+                  <a:srgbClr val="808080"/>
+                </a:outerShdw>
+              </a:effectLst>
+            </a:endParaRPr>
           </a:p>
           <a:p>
             <a:pPr algn="l" rtl="0">
@@ -3795,7 +4245,27 @@
                   </a:outerShdw>
                 </a:effectLst>
               </a:rPr>
-              <a:t>Another script is called, to run the MATLAB module with the input file.</a:t>
+              <a:t>Another script is called, to run the </a:t>
+            </a:r>
+            <a:r>
+              <a:rPr lang="en-US" sz="900" b="1" dirty="0" smtClean="0">
+                <a:effectLst>
+                  <a:outerShdw blurRad="38100" dist="38100" dir="2700000" algn="tl">
+                    <a:srgbClr val="808080"/>
+                  </a:outerShdw>
+                </a:effectLst>
+              </a:rPr>
+              <a:t>Matlab </a:t>
+            </a:r>
+            <a:r>
+              <a:rPr lang="en-US" sz="900" b="1" dirty="0" smtClean="0">
+                <a:effectLst>
+                  <a:outerShdw blurRad="38100" dist="38100" dir="2700000" algn="tl">
+                    <a:srgbClr val="808080"/>
+                  </a:outerShdw>
+                </a:effectLst>
+              </a:rPr>
+              <a:t>module with the input file.</a:t>
             </a:r>
           </a:p>
           <a:p>
@@ -3811,7 +4281,17 @@
                   </a:outerShdw>
                 </a:effectLst>
               </a:rPr>
-              <a:t>MATLAB  module is divided into 2 parts:</a:t>
+              <a:t>Matlab  </a:t>
+            </a:r>
+            <a:r>
+              <a:rPr lang="en-US" sz="900" b="1" dirty="0" smtClean="0">
+                <a:effectLst>
+                  <a:outerShdw blurRad="38100" dist="38100" dir="2700000" algn="tl">
+                    <a:srgbClr val="808080"/>
+                  </a:outerShdw>
+                </a:effectLst>
+              </a:rPr>
+              <a:t>module is divided into 2 parts:</a:t>
             </a:r>
           </a:p>
           <a:p>
@@ -3840,7 +4320,27 @@
                   </a:outerShdw>
                 </a:effectLst>
               </a:rPr>
-              <a:t>in addition computing a 3d plot based on a few sample points</a:t>
+              <a:t>in addition computing a </a:t>
+            </a:r>
+            <a:r>
+              <a:rPr lang="en-US" sz="900" b="1" dirty="0" smtClean="0">
+                <a:effectLst>
+                  <a:outerShdw blurRad="38100" dist="38100" dir="2700000" algn="tl">
+                    <a:srgbClr val="808080"/>
+                  </a:outerShdw>
+                </a:effectLst>
+              </a:rPr>
+              <a:t>3D </a:t>
+            </a:r>
+            <a:r>
+              <a:rPr lang="en-US" sz="900" b="1" dirty="0" smtClean="0">
+                <a:effectLst>
+                  <a:outerShdw blurRad="38100" dist="38100" dir="2700000" algn="tl">
+                    <a:srgbClr val="808080"/>
+                  </a:outerShdw>
+                </a:effectLst>
+              </a:rPr>
+              <a:t>plot based on a few sample points</a:t>
             </a:r>
           </a:p>
           <a:p>
@@ -3921,17 +4421,27 @@
                   </a:outerShdw>
                 </a:effectLst>
               </a:rPr>
-              <a:t> the main approach </a:t>
-            </a:r>
-            <a:r>
-              <a:rPr lang="en-US" sz="900" b="1" dirty="0" smtClean="0">
-                <a:effectLst>
-                  <a:outerShdw blurRad="38100" dist="38100" dir="2700000" algn="tl">
-                    <a:srgbClr val="808080"/>
-                  </a:outerShdw>
-                </a:effectLst>
-              </a:rPr>
-              <a:t>was to find the best way to show the distortion of network distances.</a:t>
+              <a:t> </a:t>
+            </a:r>
+            <a:r>
+              <a:rPr lang="en-US" sz="900" b="1" dirty="0" smtClean="0">
+                <a:effectLst>
+                  <a:outerShdw blurRad="38100" dist="38100" dir="2700000" algn="tl">
+                    <a:srgbClr val="808080"/>
+                  </a:outerShdw>
+                </a:effectLst>
+              </a:rPr>
+              <a:t>The </a:t>
+            </a:r>
+            <a:r>
+              <a:rPr lang="en-US" sz="900" b="1" dirty="0" smtClean="0">
+                <a:effectLst>
+                  <a:outerShdw blurRad="38100" dist="38100" dir="2700000" algn="tl">
+                    <a:srgbClr val="808080"/>
+                  </a:outerShdw>
+                </a:effectLst>
+              </a:rPr>
+              <a:t>main approach was to find the best way to show the distortion of network distances.</a:t>
             </a:r>
           </a:p>
           <a:p>
@@ -3947,7 +4457,27 @@
                   </a:outerShdw>
                 </a:effectLst>
               </a:rPr>
-              <a:t>the visualization is based on showing the ratio between the virtual distance and the real distance, instead of solely showing the virtual distance which gets higher in large distances, and also instead of showing the mathematical difference between them which will show greater difference with greater distances as well.</a:t>
+              <a:t> T</a:t>
+            </a:r>
+            <a:r>
+              <a:rPr lang="en-US" sz="900" b="1" dirty="0" smtClean="0">
+                <a:effectLst>
+                  <a:outerShdw blurRad="38100" dist="38100" dir="2700000" algn="tl">
+                    <a:srgbClr val="808080"/>
+                  </a:outerShdw>
+                </a:effectLst>
+              </a:rPr>
+              <a:t>he </a:t>
+            </a:r>
+            <a:r>
+              <a:rPr lang="en-US" sz="900" b="1" dirty="0" smtClean="0">
+                <a:effectLst>
+                  <a:outerShdw blurRad="38100" dist="38100" dir="2700000" algn="tl">
+                    <a:srgbClr val="808080"/>
+                  </a:outerShdw>
+                </a:effectLst>
+              </a:rPr>
+              <a:t>visualization is based on showing the ratio between the virtual distance and the real distance, instead of solely showing the virtual distance which gets higher in large distances, and also instead of showing the mathematical difference between them which will show greater difference with greater distances as well.</a:t>
             </a:r>
           </a:p>
           <a:p>

</xml_diff>